<commit_message>
Added pics to my ppt
</commit_message>
<xml_diff>
--- a/Documentation/Power Points/Robotics Design.pptx
+++ b/Documentation/Power Points/Robotics Design.pptx
@@ -9,6 +9,8 @@
     <p:sldId id="257" r:id="rId3"/>
     <p:sldId id="259" r:id="rId4"/>
     <p:sldId id="258" r:id="rId5"/>
+    <p:sldId id="260" r:id="rId6"/>
+    <p:sldId id="261" r:id="rId7"/>
   </p:sldIdLst>
   <p:sldSz cx="9144000" cy="6858000" type="screen4x3"/>
   <p:notesSz cx="6858000" cy="9144000"/>
@@ -304,7 +306,7 @@
           <a:p>
             <a:fld id="{662219B0-33F1-41A9-8948-05E56ED65E57}" type="datetimeFigureOut">
               <a:rPr lang="en-US" smtClean="0"/>
-              <a:t>10/15/2012</a:t>
+              <a:t>10/16/2012</a:t>
             </a:fld>
             <a:endParaRPr lang="en-US"/>
           </a:p>
@@ -469,7 +471,7 @@
           <a:p>
             <a:fld id="{662219B0-33F1-41A9-8948-05E56ED65E57}" type="datetimeFigureOut">
               <a:rPr lang="en-US" smtClean="0"/>
-              <a:t>10/15/2012</a:t>
+              <a:t>10/16/2012</a:t>
             </a:fld>
             <a:endParaRPr lang="en-US"/>
           </a:p>
@@ -644,7 +646,7 @@
           <a:p>
             <a:fld id="{662219B0-33F1-41A9-8948-05E56ED65E57}" type="datetimeFigureOut">
               <a:rPr lang="en-US" smtClean="0"/>
-              <a:t>10/15/2012</a:t>
+              <a:t>10/16/2012</a:t>
             </a:fld>
             <a:endParaRPr lang="en-US"/>
           </a:p>
@@ -809,7 +811,7 @@
           <a:p>
             <a:fld id="{662219B0-33F1-41A9-8948-05E56ED65E57}" type="datetimeFigureOut">
               <a:rPr lang="en-US" smtClean="0"/>
-              <a:t>10/15/2012</a:t>
+              <a:t>10/16/2012</a:t>
             </a:fld>
             <a:endParaRPr lang="en-US"/>
           </a:p>
@@ -1050,7 +1052,7 @@
           <a:p>
             <a:fld id="{662219B0-33F1-41A9-8948-05E56ED65E57}" type="datetimeFigureOut">
               <a:rPr lang="en-US" smtClean="0"/>
-              <a:t>10/15/2012</a:t>
+              <a:t>10/16/2012</a:t>
             </a:fld>
             <a:endParaRPr lang="en-US"/>
           </a:p>
@@ -1333,7 +1335,7 @@
           <a:p>
             <a:fld id="{662219B0-33F1-41A9-8948-05E56ED65E57}" type="datetimeFigureOut">
               <a:rPr lang="en-US" smtClean="0"/>
-              <a:t>10/15/2012</a:t>
+              <a:t>10/16/2012</a:t>
             </a:fld>
             <a:endParaRPr lang="en-US"/>
           </a:p>
@@ -1762,7 +1764,7 @@
           <a:p>
             <a:fld id="{662219B0-33F1-41A9-8948-05E56ED65E57}" type="datetimeFigureOut">
               <a:rPr lang="en-US" smtClean="0"/>
-              <a:t>10/15/2012</a:t>
+              <a:t>10/16/2012</a:t>
             </a:fld>
             <a:endParaRPr lang="en-US"/>
           </a:p>
@@ -1875,7 +1877,7 @@
           <a:p>
             <a:fld id="{662219B0-33F1-41A9-8948-05E56ED65E57}" type="datetimeFigureOut">
               <a:rPr lang="en-US" smtClean="0"/>
-              <a:t>10/15/2012</a:t>
+              <a:t>10/16/2012</a:t>
             </a:fld>
             <a:endParaRPr lang="en-US"/>
           </a:p>
@@ -1965,7 +1967,7 @@
           <a:p>
             <a:fld id="{662219B0-33F1-41A9-8948-05E56ED65E57}" type="datetimeFigureOut">
               <a:rPr lang="en-US" smtClean="0"/>
-              <a:t>10/15/2012</a:t>
+              <a:t>10/16/2012</a:t>
             </a:fld>
             <a:endParaRPr lang="en-US"/>
           </a:p>
@@ -2154,7 +2156,7 @@
           <a:p>
             <a:fld id="{662219B0-33F1-41A9-8948-05E56ED65E57}" type="datetimeFigureOut">
               <a:rPr lang="en-US" smtClean="0"/>
-              <a:t>10/15/2012</a:t>
+              <a:t>10/16/2012</a:t>
             </a:fld>
             <a:endParaRPr lang="en-US"/>
           </a:p>
@@ -2472,7 +2474,7 @@
           <a:p>
             <a:fld id="{662219B0-33F1-41A9-8948-05E56ED65E57}" type="datetimeFigureOut">
               <a:rPr lang="en-US" smtClean="0"/>
-              <a:t>10/15/2012</a:t>
+              <a:t>10/16/2012</a:t>
             </a:fld>
             <a:endParaRPr lang="en-US"/>
           </a:p>
@@ -2851,7 +2853,7 @@
           <a:p>
             <a:fld id="{662219B0-33F1-41A9-8948-05E56ED65E57}" type="datetimeFigureOut">
               <a:rPr lang="en-US" smtClean="0"/>
-              <a:t>10/15/2012</a:t>
+              <a:t>10/16/2012</a:t>
             </a:fld>
             <a:endParaRPr lang="en-US"/>
           </a:p>
@@ -4264,6 +4266,803 @@
 </p:sld>
 </file>
 
+<file path=ppt/slides/slide5.xml><?xml version="1.0" encoding="utf-8"?>
+<p:sld xmlns:a="http://schemas.openxmlformats.org/drawingml/2006/main" xmlns:r="http://schemas.openxmlformats.org/officeDocument/2006/relationships" xmlns:p="http://schemas.openxmlformats.org/presentationml/2006/main">
+  <p:cSld>
+    <p:spTree>
+      <p:nvGrpSpPr>
+        <p:cNvPr id="1" name=""/>
+        <p:cNvGrpSpPr/>
+        <p:nvPr/>
+      </p:nvGrpSpPr>
+      <p:grpSpPr>
+        <a:xfrm>
+          <a:off x="0" y="0"/>
+          <a:ext cx="0" cy="0"/>
+          <a:chOff x="0" y="0"/>
+          <a:chExt cx="0" cy="0"/>
+        </a:xfrm>
+      </p:grpSpPr>
+      <p:pic>
+        <p:nvPicPr>
+          <p:cNvPr id="4" name="Picture 3"/>
+          <p:cNvPicPr>
+            <a:picLocks noChangeAspect="1"/>
+          </p:cNvPicPr>
+          <p:nvPr/>
+        </p:nvPicPr>
+        <p:blipFill rotWithShape="1">
+          <a:blip r:embed="rId2">
+            <a:extLst>
+              <a:ext uri="{28A0092B-C50C-407E-A947-70E740481C1C}">
+                <a14:useLocalDpi xmlns:a14="http://schemas.microsoft.com/office/drawing/2010/main" val="0"/>
+              </a:ext>
+            </a:extLst>
+          </a:blip>
+          <a:srcRect l="27264" r="38435"/>
+          <a:stretch/>
+        </p:blipFill>
+        <p:spPr>
+          <a:xfrm>
+            <a:off x="2138638" y="115245"/>
+            <a:ext cx="3962485" cy="6579834"/>
+          </a:xfrm>
+          <a:prstGeom prst="rect">
+            <a:avLst/>
+          </a:prstGeom>
+        </p:spPr>
+      </p:pic>
+      <p:pic>
+        <p:nvPicPr>
+          <p:cNvPr id="5" name="Picture 4" descr="http://sine.ni.com/images/products/us/crio-9024_l.jpg"/>
+          <p:cNvPicPr>
+            <a:picLocks noChangeAspect="1" noChangeArrowheads="1"/>
+          </p:cNvPicPr>
+          <p:nvPr/>
+        </p:nvPicPr>
+        <p:blipFill rotWithShape="1">
+          <a:blip r:embed="rId3">
+            <a:extLst>
+              <a:ext uri="{28A0092B-C50C-407E-A947-70E740481C1C}">
+                <a14:useLocalDpi xmlns:a14="http://schemas.microsoft.com/office/drawing/2010/main" val="0"/>
+              </a:ext>
+            </a:extLst>
+          </a:blip>
+          <a:srcRect l="13223" t="4817" r="16365" b="7120"/>
+          <a:stretch/>
+        </p:blipFill>
+        <p:spPr bwMode="auto">
+          <a:xfrm>
+            <a:off x="6629400" y="3715065"/>
+            <a:ext cx="1673912" cy="1523024"/>
+          </a:xfrm>
+          <a:prstGeom prst="rect">
+            <a:avLst/>
+          </a:prstGeom>
+          <a:noFill/>
+          <a:extLst>
+            <a:ext uri="{909E8E84-426E-40DD-AFC4-6F175D3DCCD1}">
+              <a14:hiddenFill xmlns:a14="http://schemas.microsoft.com/office/drawing/2010/main">
+                <a:solidFill>
+                  <a:srgbClr val="FFFFFF"/>
+                </a:solidFill>
+              </a14:hiddenFill>
+            </a:ext>
+          </a:extLst>
+        </p:spPr>
+      </p:pic>
+      <p:pic>
+        <p:nvPicPr>
+          <p:cNvPr id="8" name="Picture 10" descr="http://robotbox.net/sites/default/files/imagecache/normal/part_pics/roboteq-motor-controler/roboteq.jpg"/>
+          <p:cNvPicPr>
+            <a:picLocks noChangeAspect="1" noChangeArrowheads="1"/>
+          </p:cNvPicPr>
+          <p:nvPr/>
+        </p:nvPicPr>
+        <p:blipFill>
+          <a:blip r:embed="rId4">
+            <a:extLst>
+              <a:ext uri="{28A0092B-C50C-407E-A947-70E740481C1C}">
+                <a14:useLocalDpi xmlns:a14="http://schemas.microsoft.com/office/drawing/2010/main" val="0"/>
+              </a:ext>
+            </a:extLst>
+          </a:blip>
+          <a:srcRect/>
+          <a:stretch>
+            <a:fillRect/>
+          </a:stretch>
+        </p:blipFill>
+        <p:spPr bwMode="auto">
+          <a:xfrm>
+            <a:off x="-7218" y="2274773"/>
+            <a:ext cx="2090613" cy="1099662"/>
+          </a:xfrm>
+          <a:prstGeom prst="rect">
+            <a:avLst/>
+          </a:prstGeom>
+          <a:noFill/>
+          <a:extLst>
+            <a:ext uri="{909E8E84-426E-40DD-AFC4-6F175D3DCCD1}">
+              <a14:hiddenFill xmlns:a14="http://schemas.microsoft.com/office/drawing/2010/main">
+                <a:solidFill>
+                  <a:srgbClr val="FFFFFF"/>
+                </a:solidFill>
+              </a14:hiddenFill>
+            </a:ext>
+          </a:extLst>
+        </p:spPr>
+      </p:pic>
+      <p:pic>
+        <p:nvPicPr>
+          <p:cNvPr id="9" name="Picture 12" descr="http://www.itcelectronics.com/images/Power%20Sonic%20PS-1270F1.jpg"/>
+          <p:cNvPicPr>
+            <a:picLocks noChangeAspect="1" noChangeArrowheads="1"/>
+          </p:cNvPicPr>
+          <p:nvPr/>
+        </p:nvPicPr>
+        <p:blipFill>
+          <a:blip r:embed="rId5" cstate="print">
+            <a:extLst>
+              <a:ext uri="{28A0092B-C50C-407E-A947-70E740481C1C}">
+                <a14:useLocalDpi xmlns:a14="http://schemas.microsoft.com/office/drawing/2010/main" val="0"/>
+              </a:ext>
+            </a:extLst>
+          </a:blip>
+          <a:srcRect/>
+          <a:stretch>
+            <a:fillRect/>
+          </a:stretch>
+        </p:blipFill>
+        <p:spPr bwMode="auto">
+          <a:xfrm>
+            <a:off x="6165933" y="5217937"/>
+            <a:ext cx="2133600" cy="1486401"/>
+          </a:xfrm>
+          <a:prstGeom prst="rect">
+            <a:avLst/>
+          </a:prstGeom>
+          <a:noFill/>
+          <a:extLst>
+            <a:ext uri="{909E8E84-426E-40DD-AFC4-6F175D3DCCD1}">
+              <a14:hiddenFill xmlns:a14="http://schemas.microsoft.com/office/drawing/2010/main">
+                <a:solidFill>
+                  <a:srgbClr val="FFFFFF"/>
+                </a:solidFill>
+              </a14:hiddenFill>
+            </a:ext>
+          </a:extLst>
+        </p:spPr>
+      </p:pic>
+      <p:pic>
+        <p:nvPicPr>
+          <p:cNvPr id="1028" name="Picture 4" descr="http://www.roboteq.com/files_n_images/images/mdc2250-cover.jpg"/>
+          <p:cNvPicPr>
+            <a:picLocks noChangeAspect="1" noChangeArrowheads="1"/>
+          </p:cNvPicPr>
+          <p:nvPr/>
+        </p:nvPicPr>
+        <p:blipFill>
+          <a:blip r:embed="rId6" cstate="print">
+            <a:extLst>
+              <a:ext uri="{28A0092B-C50C-407E-A947-70E740481C1C}">
+                <a14:useLocalDpi xmlns:a14="http://schemas.microsoft.com/office/drawing/2010/main" val="0"/>
+              </a:ext>
+            </a:extLst>
+          </a:blip>
+          <a:srcRect/>
+          <a:stretch>
+            <a:fillRect/>
+          </a:stretch>
+        </p:blipFill>
+        <p:spPr bwMode="auto">
+          <a:xfrm>
+            <a:off x="264397" y="3581400"/>
+            <a:ext cx="1547381" cy="1215605"/>
+          </a:xfrm>
+          <a:prstGeom prst="rect">
+            <a:avLst/>
+          </a:prstGeom>
+          <a:noFill/>
+          <a:extLst>
+            <a:ext uri="{909E8E84-426E-40DD-AFC4-6F175D3DCCD1}">
+              <a14:hiddenFill xmlns:a14="http://schemas.microsoft.com/office/drawing/2010/main">
+                <a:solidFill>
+                  <a:srgbClr val="FFFFFF"/>
+                </a:solidFill>
+              </a14:hiddenFill>
+            </a:ext>
+          </a:extLst>
+        </p:spPr>
+      </p:pic>
+      <p:pic>
+        <p:nvPicPr>
+          <p:cNvPr id="15" name="Picture 6" descr="http://www.hubmotors.com/media/catalog/product/cache/10/image/9df78eab33525d08d6e5fb8d27136e95/2/8/280-1368m_1.jpg"/>
+          <p:cNvPicPr>
+            <a:picLocks noChangeAspect="1" noChangeArrowheads="1"/>
+          </p:cNvPicPr>
+          <p:nvPr/>
+        </p:nvPicPr>
+        <p:blipFill rotWithShape="1">
+          <a:blip r:embed="rId7" cstate="print">
+            <a:extLst>
+              <a:ext uri="{28A0092B-C50C-407E-A947-70E740481C1C}">
+                <a14:useLocalDpi xmlns:a14="http://schemas.microsoft.com/office/drawing/2010/main" val="0"/>
+              </a:ext>
+            </a:extLst>
+          </a:blip>
+          <a:srcRect l="18672" t="4179" r="13351" b="4084"/>
+          <a:stretch/>
+        </p:blipFill>
+        <p:spPr bwMode="auto">
+          <a:xfrm>
+            <a:off x="609600" y="4926328"/>
+            <a:ext cx="1295473" cy="1748260"/>
+          </a:xfrm>
+          <a:prstGeom prst="rect">
+            <a:avLst/>
+          </a:prstGeom>
+          <a:noFill/>
+          <a:extLst>
+            <a:ext uri="{909E8E84-426E-40DD-AFC4-6F175D3DCCD1}">
+              <a14:hiddenFill xmlns:a14="http://schemas.microsoft.com/office/drawing/2010/main">
+                <a:solidFill>
+                  <a:srgbClr val="FFFFFF"/>
+                </a:solidFill>
+              </a14:hiddenFill>
+            </a:ext>
+          </a:extLst>
+        </p:spPr>
+      </p:pic>
+      <p:pic>
+        <p:nvPicPr>
+          <p:cNvPr id="16" name="Picture 6" descr="http://www.hubmotors.com/media/catalog/product/cache/10/image/9df78eab33525d08d6e5fb8d27136e95/2/8/280-1368m_1.jpg"/>
+          <p:cNvPicPr>
+            <a:picLocks noChangeAspect="1" noChangeArrowheads="1"/>
+          </p:cNvPicPr>
+          <p:nvPr/>
+        </p:nvPicPr>
+        <p:blipFill rotWithShape="1">
+          <a:blip r:embed="rId7" cstate="print">
+            <a:extLst>
+              <a:ext uri="{28A0092B-C50C-407E-A947-70E740481C1C}">
+                <a14:useLocalDpi xmlns:a14="http://schemas.microsoft.com/office/drawing/2010/main" val="0"/>
+              </a:ext>
+            </a:extLst>
+          </a:blip>
+          <a:srcRect l="18672" t="4179" r="13351" b="4084"/>
+          <a:stretch/>
+        </p:blipFill>
+        <p:spPr bwMode="auto">
+          <a:xfrm>
+            <a:off x="787922" y="152400"/>
+            <a:ext cx="1295473" cy="1748260"/>
+          </a:xfrm>
+          <a:prstGeom prst="rect">
+            <a:avLst/>
+          </a:prstGeom>
+          <a:noFill/>
+          <a:extLst>
+            <a:ext uri="{909E8E84-426E-40DD-AFC4-6F175D3DCCD1}">
+              <a14:hiddenFill xmlns:a14="http://schemas.microsoft.com/office/drawing/2010/main">
+                <a:solidFill>
+                  <a:srgbClr val="FFFFFF"/>
+                </a:solidFill>
+              </a14:hiddenFill>
+            </a:ext>
+          </a:extLst>
+        </p:spPr>
+      </p:pic>
+      <p:pic>
+        <p:nvPicPr>
+          <p:cNvPr id="1032" name="Picture 8" descr="Banebots P80 Gearbox: Standard Shaft, CIM Mount, 12:1"/>
+          <p:cNvPicPr>
+            <a:picLocks noChangeAspect="1" noChangeArrowheads="1"/>
+          </p:cNvPicPr>
+          <p:nvPr/>
+        </p:nvPicPr>
+        <p:blipFill rotWithShape="1">
+          <a:blip r:embed="rId8">
+            <a:extLst>
+              <a:ext uri="{28A0092B-C50C-407E-A947-70E740481C1C}">
+                <a14:useLocalDpi xmlns:a14="http://schemas.microsoft.com/office/drawing/2010/main" val="0"/>
+              </a:ext>
+            </a:extLst>
+          </a:blip>
+          <a:srcRect t="11950" b="33798"/>
+          <a:stretch/>
+        </p:blipFill>
+        <p:spPr bwMode="auto">
+          <a:xfrm>
+            <a:off x="6488210" y="1324730"/>
+            <a:ext cx="1912314" cy="1037470"/>
+          </a:xfrm>
+          <a:prstGeom prst="rect">
+            <a:avLst/>
+          </a:prstGeom>
+          <a:noFill/>
+          <a:extLst>
+            <a:ext uri="{909E8E84-426E-40DD-AFC4-6F175D3DCCD1}">
+              <a14:hiddenFill xmlns:a14="http://schemas.microsoft.com/office/drawing/2010/main">
+                <a:solidFill>
+                  <a:srgbClr val="FFFFFF"/>
+                </a:solidFill>
+              </a14:hiddenFill>
+            </a:ext>
+          </a:extLst>
+        </p:spPr>
+      </p:pic>
+      <p:pic>
+        <p:nvPicPr>
+          <p:cNvPr id="7" name="Picture 8" descr="http://www.seattlerobotics.org/encoder/200610/article3/IMU%20Odometry,%20by%20David%20Anderson_files/3dmgx1.jpg"/>
+          <p:cNvPicPr>
+            <a:picLocks noChangeAspect="1" noChangeArrowheads="1"/>
+          </p:cNvPicPr>
+          <p:nvPr/>
+        </p:nvPicPr>
+        <p:blipFill>
+          <a:blip r:embed="rId9">
+            <a:extLst>
+              <a:ext uri="{28A0092B-C50C-407E-A947-70E740481C1C}">
+                <a14:useLocalDpi xmlns:a14="http://schemas.microsoft.com/office/drawing/2010/main" val="0"/>
+              </a:ext>
+            </a:extLst>
+          </a:blip>
+          <a:srcRect/>
+          <a:stretch>
+            <a:fillRect/>
+          </a:stretch>
+        </p:blipFill>
+        <p:spPr bwMode="auto">
+          <a:xfrm>
+            <a:off x="6149284" y="2362200"/>
+            <a:ext cx="1878631" cy="1424924"/>
+          </a:xfrm>
+          <a:prstGeom prst="rect">
+            <a:avLst/>
+          </a:prstGeom>
+          <a:noFill/>
+          <a:extLst>
+            <a:ext uri="{909E8E84-426E-40DD-AFC4-6F175D3DCCD1}">
+              <a14:hiddenFill xmlns:a14="http://schemas.microsoft.com/office/drawing/2010/main">
+                <a:solidFill>
+                  <a:srgbClr val="FFFFFF"/>
+                </a:solidFill>
+              </a14:hiddenFill>
+            </a:ext>
+          </a:extLst>
+        </p:spPr>
+      </p:pic>
+      <p:pic>
+        <p:nvPicPr>
+          <p:cNvPr id="1030" name="Picture 6" descr=".500"/>
+          <p:cNvPicPr>
+            <a:picLocks noChangeAspect="1" noChangeArrowheads="1"/>
+          </p:cNvPicPr>
+          <p:nvPr/>
+        </p:nvPicPr>
+        <p:blipFill>
+          <a:blip r:embed="rId10">
+            <a:extLst>
+              <a:ext uri="{28A0092B-C50C-407E-A947-70E740481C1C}">
+                <a14:useLocalDpi xmlns:a14="http://schemas.microsoft.com/office/drawing/2010/main" val="0"/>
+              </a:ext>
+            </a:extLst>
+          </a:blip>
+          <a:srcRect/>
+          <a:stretch>
+            <a:fillRect/>
+          </a:stretch>
+        </p:blipFill>
+        <p:spPr bwMode="auto">
+          <a:xfrm>
+            <a:off x="6291069" y="152400"/>
+            <a:ext cx="1207267" cy="1207267"/>
+          </a:xfrm>
+          <a:prstGeom prst="rect">
+            <a:avLst/>
+          </a:prstGeom>
+          <a:noFill/>
+          <a:extLst>
+            <a:ext uri="{909E8E84-426E-40DD-AFC4-6F175D3DCCD1}">
+              <a14:hiddenFill xmlns:a14="http://schemas.microsoft.com/office/drawing/2010/main">
+                <a:solidFill>
+                  <a:srgbClr val="FFFFFF"/>
+                </a:solidFill>
+              </a14:hiddenFill>
+            </a:ext>
+          </a:extLst>
+        </p:spPr>
+      </p:pic>
+    </p:spTree>
+    <p:extLst>
+      <p:ext uri="{BB962C8B-B14F-4D97-AF65-F5344CB8AC3E}">
+        <p14:creationId xmlns:p14="http://schemas.microsoft.com/office/powerpoint/2010/main" val="128733710"/>
+      </p:ext>
+    </p:extLst>
+  </p:cSld>
+  <p:clrMapOvr>
+    <a:masterClrMapping/>
+  </p:clrMapOvr>
+  <p:timing>
+    <p:tnLst>
+      <p:par>
+        <p:cTn id="1" dur="indefinite" restart="never" nodeType="tmRoot"/>
+      </p:par>
+    </p:tnLst>
+  </p:timing>
+</p:sld>
+</file>
+
+<file path=ppt/slides/slide6.xml><?xml version="1.0" encoding="utf-8"?>
+<p:sld xmlns:a="http://schemas.openxmlformats.org/drawingml/2006/main" xmlns:r="http://schemas.openxmlformats.org/officeDocument/2006/relationships" xmlns:p="http://schemas.openxmlformats.org/presentationml/2006/main">
+  <p:cSld>
+    <p:spTree>
+      <p:nvGrpSpPr>
+        <p:cNvPr id="1" name=""/>
+        <p:cNvGrpSpPr/>
+        <p:nvPr/>
+      </p:nvGrpSpPr>
+      <p:grpSpPr>
+        <a:xfrm>
+          <a:off x="0" y="0"/>
+          <a:ext cx="0" cy="0"/>
+          <a:chOff x="0" y="0"/>
+          <a:chExt cx="0" cy="0"/>
+        </a:xfrm>
+      </p:grpSpPr>
+      <p:pic>
+        <p:nvPicPr>
+          <p:cNvPr id="6" name="Picture 5"/>
+          <p:cNvPicPr>
+            <a:picLocks noChangeAspect="1"/>
+          </p:cNvPicPr>
+          <p:nvPr/>
+        </p:nvPicPr>
+        <p:blipFill>
+          <a:blip r:embed="rId2">
+            <a:extLst>
+              <a:ext uri="{28A0092B-C50C-407E-A947-70E740481C1C}">
+                <a14:useLocalDpi xmlns:a14="http://schemas.microsoft.com/office/drawing/2010/main" val="0"/>
+              </a:ext>
+            </a:extLst>
+          </a:blip>
+          <a:stretch>
+            <a:fillRect/>
+          </a:stretch>
+        </p:blipFill>
+        <p:spPr>
+          <a:xfrm>
+            <a:off x="146851" y="1459136"/>
+            <a:ext cx="8160760" cy="4648200"/>
+          </a:xfrm>
+          <a:prstGeom prst="rect">
+            <a:avLst/>
+          </a:prstGeom>
+        </p:spPr>
+      </p:pic>
+      <p:pic>
+        <p:nvPicPr>
+          <p:cNvPr id="5" name="Picture 4"/>
+          <p:cNvPicPr>
+            <a:picLocks noChangeAspect="1"/>
+          </p:cNvPicPr>
+          <p:nvPr/>
+        </p:nvPicPr>
+        <p:blipFill>
+          <a:blip r:embed="rId3">
+            <a:extLst>
+              <a:ext uri="{28A0092B-C50C-407E-A947-70E740481C1C}">
+                <a14:useLocalDpi xmlns:a14="http://schemas.microsoft.com/office/drawing/2010/main" val="0"/>
+              </a:ext>
+            </a:extLst>
+          </a:blip>
+          <a:stretch>
+            <a:fillRect/>
+          </a:stretch>
+        </p:blipFill>
+        <p:spPr>
+          <a:xfrm>
+            <a:off x="146851" y="1447800"/>
+            <a:ext cx="8160760" cy="4648200"/>
+          </a:xfrm>
+          <a:prstGeom prst="rect">
+            <a:avLst/>
+          </a:prstGeom>
+        </p:spPr>
+      </p:pic>
+      <p:pic>
+        <p:nvPicPr>
+          <p:cNvPr id="4" name="Picture 3"/>
+          <p:cNvPicPr>
+            <a:picLocks noChangeAspect="1"/>
+          </p:cNvPicPr>
+          <p:nvPr/>
+        </p:nvPicPr>
+        <p:blipFill>
+          <a:blip r:embed="rId4">
+            <a:extLst>
+              <a:ext uri="{28A0092B-C50C-407E-A947-70E740481C1C}">
+                <a14:useLocalDpi xmlns:a14="http://schemas.microsoft.com/office/drawing/2010/main" val="0"/>
+              </a:ext>
+            </a:extLst>
+          </a:blip>
+          <a:stretch>
+            <a:fillRect/>
+          </a:stretch>
+        </p:blipFill>
+        <p:spPr>
+          <a:xfrm>
+            <a:off x="146851" y="1447800"/>
+            <a:ext cx="8160760" cy="4648200"/>
+          </a:xfrm>
+          <a:prstGeom prst="rect">
+            <a:avLst/>
+          </a:prstGeom>
+        </p:spPr>
+      </p:pic>
+      <p:sp>
+        <p:nvSpPr>
+          <p:cNvPr id="2" name="Title 1"/>
+          <p:cNvSpPr>
+            <a:spLocks noGrp="1"/>
+          </p:cNvSpPr>
+          <p:nvPr>
+            <p:ph type="title"/>
+          </p:nvPr>
+        </p:nvSpPr>
+        <p:spPr/>
+        <p:txBody>
+          <a:bodyPr/>
+          <a:lstStyle/>
+          <a:p>
+            <a:r>
+              <a:rPr lang="en-US" dirty="0" smtClean="0"/>
+              <a:t>Operation</a:t>
+            </a:r>
+            <a:endParaRPr lang="en-US" dirty="0"/>
+          </a:p>
+        </p:txBody>
+      </p:sp>
+      <p:pic>
+        <p:nvPicPr>
+          <p:cNvPr id="3" name="Picture 2"/>
+          <p:cNvPicPr>
+            <a:picLocks noChangeAspect="1"/>
+          </p:cNvPicPr>
+          <p:nvPr/>
+        </p:nvPicPr>
+        <p:blipFill>
+          <a:blip r:embed="rId5">
+            <a:extLst>
+              <a:ext uri="{28A0092B-C50C-407E-A947-70E740481C1C}">
+                <a14:useLocalDpi xmlns:a14="http://schemas.microsoft.com/office/drawing/2010/main" val="0"/>
+              </a:ext>
+            </a:extLst>
+          </a:blip>
+          <a:stretch>
+            <a:fillRect/>
+          </a:stretch>
+        </p:blipFill>
+        <p:spPr>
+          <a:xfrm>
+            <a:off x="146851" y="1447800"/>
+            <a:ext cx="8160760" cy="4648200"/>
+          </a:xfrm>
+          <a:prstGeom prst="rect">
+            <a:avLst/>
+          </a:prstGeom>
+        </p:spPr>
+      </p:pic>
+    </p:spTree>
+    <p:extLst>
+      <p:ext uri="{BB962C8B-B14F-4D97-AF65-F5344CB8AC3E}">
+        <p14:creationId xmlns:p14="http://schemas.microsoft.com/office/powerpoint/2010/main" val="4218338693"/>
+      </p:ext>
+    </p:extLst>
+  </p:cSld>
+  <p:clrMapOvr>
+    <a:masterClrMapping/>
+  </p:clrMapOvr>
+  <mc:AlternateContent xmlns:mc="http://schemas.openxmlformats.org/markup-compatibility/2006">
+    <mc:Choice xmlns:p14="http://schemas.microsoft.com/office/powerpoint/2010/main" Requires="p14">
+      <p:transition spd="slow" p14:dur="2000"/>
+    </mc:Choice>
+    <mc:Fallback>
+      <p:transition spd="slow"/>
+    </mc:Fallback>
+  </mc:AlternateContent>
+  <p:timing>
+    <p:tnLst>
+      <p:par>
+        <p:cTn id="1" dur="indefinite" restart="never" nodeType="tmRoot">
+          <p:childTnLst>
+            <p:seq concurrent="1" nextAc="seek">
+              <p:cTn id="2" dur="indefinite" nodeType="mainSeq">
+                <p:childTnLst>
+                  <p:par>
+                    <p:cTn id="3" fill="hold">
+                      <p:stCondLst>
+                        <p:cond delay="indefinite"/>
+                      </p:stCondLst>
+                      <p:childTnLst>
+                        <p:par>
+                          <p:cTn id="4" fill="hold">
+                            <p:stCondLst>
+                              <p:cond delay="0"/>
+                            </p:stCondLst>
+                            <p:childTnLst>
+                              <p:par>
+                                <p:cTn id="5" presetID="10" presetClass="entr" presetSubtype="0" fill="hold" nodeType="clickEffect">
+                                  <p:stCondLst>
+                                    <p:cond delay="0"/>
+                                  </p:stCondLst>
+                                  <p:childTnLst>
+                                    <p:set>
+                                      <p:cBhvr>
+                                        <p:cTn id="6" dur="1" fill="hold">
+                                          <p:stCondLst>
+                                            <p:cond delay="0"/>
+                                          </p:stCondLst>
+                                        </p:cTn>
+                                        <p:tgtEl>
+                                          <p:spTgt spid="5"/>
+                                        </p:tgtEl>
+                                        <p:attrNameLst>
+                                          <p:attrName>style.visibility</p:attrName>
+                                        </p:attrNameLst>
+                                      </p:cBhvr>
+                                      <p:to>
+                                        <p:strVal val="visible"/>
+                                      </p:to>
+                                    </p:set>
+                                    <p:animEffect transition="in" filter="fade">
+                                      <p:cBhvr>
+                                        <p:cTn id="7" dur="500"/>
+                                        <p:tgtEl>
+                                          <p:spTgt spid="5"/>
+                                        </p:tgtEl>
+                                      </p:cBhvr>
+                                    </p:animEffect>
+                                  </p:childTnLst>
+                                </p:cTn>
+                              </p:par>
+                            </p:childTnLst>
+                          </p:cTn>
+                        </p:par>
+                      </p:childTnLst>
+                    </p:cTn>
+                  </p:par>
+                  <p:par>
+                    <p:cTn id="8" fill="hold">
+                      <p:stCondLst>
+                        <p:cond delay="indefinite"/>
+                      </p:stCondLst>
+                      <p:childTnLst>
+                        <p:par>
+                          <p:cTn id="9" fill="hold">
+                            <p:stCondLst>
+                              <p:cond delay="0"/>
+                            </p:stCondLst>
+                            <p:childTnLst>
+                              <p:par>
+                                <p:cTn id="10" presetID="10" presetClass="entr" presetSubtype="0" fill="hold" nodeType="clickEffect">
+                                  <p:stCondLst>
+                                    <p:cond delay="0"/>
+                                  </p:stCondLst>
+                                  <p:childTnLst>
+                                    <p:set>
+                                      <p:cBhvr>
+                                        <p:cTn id="11" dur="1" fill="hold">
+                                          <p:stCondLst>
+                                            <p:cond delay="0"/>
+                                          </p:stCondLst>
+                                        </p:cTn>
+                                        <p:tgtEl>
+                                          <p:spTgt spid="4"/>
+                                        </p:tgtEl>
+                                        <p:attrNameLst>
+                                          <p:attrName>style.visibility</p:attrName>
+                                        </p:attrNameLst>
+                                      </p:cBhvr>
+                                      <p:to>
+                                        <p:strVal val="visible"/>
+                                      </p:to>
+                                    </p:set>
+                                    <p:animEffect transition="in" filter="fade">
+                                      <p:cBhvr>
+                                        <p:cTn id="12" dur="500"/>
+                                        <p:tgtEl>
+                                          <p:spTgt spid="4"/>
+                                        </p:tgtEl>
+                                      </p:cBhvr>
+                                    </p:animEffect>
+                                  </p:childTnLst>
+                                </p:cTn>
+                              </p:par>
+                            </p:childTnLst>
+                          </p:cTn>
+                        </p:par>
+                      </p:childTnLst>
+                    </p:cTn>
+                  </p:par>
+                  <p:par>
+                    <p:cTn id="13" fill="hold">
+                      <p:stCondLst>
+                        <p:cond delay="indefinite"/>
+                      </p:stCondLst>
+                      <p:childTnLst>
+                        <p:par>
+                          <p:cTn id="14" fill="hold">
+                            <p:stCondLst>
+                              <p:cond delay="0"/>
+                            </p:stCondLst>
+                            <p:childTnLst>
+                              <p:par>
+                                <p:cTn id="15" presetID="10" presetClass="entr" presetSubtype="0" fill="hold" nodeType="clickEffect">
+                                  <p:stCondLst>
+                                    <p:cond delay="0"/>
+                                  </p:stCondLst>
+                                  <p:childTnLst>
+                                    <p:set>
+                                      <p:cBhvr>
+                                        <p:cTn id="16" dur="1" fill="hold">
+                                          <p:stCondLst>
+                                            <p:cond delay="0"/>
+                                          </p:stCondLst>
+                                        </p:cTn>
+                                        <p:tgtEl>
+                                          <p:spTgt spid="3"/>
+                                        </p:tgtEl>
+                                        <p:attrNameLst>
+                                          <p:attrName>style.visibility</p:attrName>
+                                        </p:attrNameLst>
+                                      </p:cBhvr>
+                                      <p:to>
+                                        <p:strVal val="visible"/>
+                                      </p:to>
+                                    </p:set>
+                                    <p:animEffect transition="in" filter="fade">
+                                      <p:cBhvr>
+                                        <p:cTn id="17" dur="500"/>
+                                        <p:tgtEl>
+                                          <p:spTgt spid="3"/>
+                                        </p:tgtEl>
+                                      </p:cBhvr>
+                                    </p:animEffect>
+                                  </p:childTnLst>
+                                </p:cTn>
+                              </p:par>
+                            </p:childTnLst>
+                          </p:cTn>
+                        </p:par>
+                      </p:childTnLst>
+                    </p:cTn>
+                  </p:par>
+                </p:childTnLst>
+              </p:cTn>
+              <p:prevCondLst>
+                <p:cond evt="onPrev" delay="0">
+                  <p:tgtEl>
+                    <p:sldTgt/>
+                  </p:tgtEl>
+                </p:cond>
+              </p:prevCondLst>
+              <p:nextCondLst>
+                <p:cond evt="onNext" delay="0">
+                  <p:tgtEl>
+                    <p:sldTgt/>
+                  </p:tgtEl>
+                </p:cond>
+              </p:nextCondLst>
+            </p:seq>
+          </p:childTnLst>
+        </p:cTn>
+      </p:par>
+    </p:tnLst>
+  </p:timing>
+</p:sld>
+</file>
+
 <file path=ppt/theme/theme1.xml><?xml version="1.0" encoding="utf-8"?>
 <a:theme xmlns:a="http://schemas.openxmlformats.org/drawingml/2006/main" name="Adjacency">
   <a:themeElements>

</xml_diff>